<commit_message>
final changes pre talk
</commit_message>
<xml_diff>
--- a/amplitude_sensing_penning_2.pptx
+++ b/amplitude_sensing_penning_2.pptx
@@ -10086,6 +10086,30 @@
           </p:sp>
         </mc:Fallback>
       </mc:AlternateContent>
+      <p:pic>
+        <p:nvPicPr>
+          <p:cNvPr id="6" name="Picture 5"/>
+          <p:cNvPicPr>
+            <a:picLocks noChangeAspect="1"/>
+          </p:cNvPicPr>
+          <p:nvPr/>
+        </p:nvPicPr>
+        <p:blipFill>
+          <a:blip r:embed="rId14"/>
+          <a:stretch>
+            <a:fillRect/>
+          </a:stretch>
+        </p:blipFill>
+        <p:spPr>
+          <a:xfrm>
+            <a:off x="9599623" y="1895906"/>
+            <a:ext cx="1019532" cy="1616332"/>
+          </a:xfrm>
+          <a:prstGeom prst="rect">
+            <a:avLst/>
+          </a:prstGeom>
+        </p:spPr>
+      </p:pic>
     </p:spTree>
     <p:extLst>
       <p:ext uri="{BB962C8B-B14F-4D97-AF65-F5344CB8AC3E}">
@@ -10096,6 +10120,81 @@
   <p:clrMapOvr>
     <a:masterClrMapping/>
   </p:clrMapOvr>
+  <p:timing>
+    <p:tnLst>
+      <p:par>
+        <p:cTn id="1" dur="indefinite" restart="never" nodeType="tmRoot">
+          <p:childTnLst>
+            <p:seq concurrent="1" nextAc="seek">
+              <p:cTn id="2" dur="indefinite" nodeType="mainSeq">
+                <p:childTnLst>
+                  <p:par>
+                    <p:cTn id="3" fill="hold">
+                      <p:stCondLst>
+                        <p:cond delay="indefinite"/>
+                      </p:stCondLst>
+                      <p:childTnLst>
+                        <p:par>
+                          <p:cTn id="4" fill="hold">
+                            <p:stCondLst>
+                              <p:cond delay="0"/>
+                            </p:stCondLst>
+                            <p:childTnLst>
+                              <p:par>
+                                <p:cTn id="5" presetID="1" presetClass="entr" presetSubtype="0" fill="hold" nodeType="clickEffect">
+                                  <p:stCondLst>
+                                    <p:cond delay="0"/>
+                                  </p:stCondLst>
+                                  <p:childTnLst>
+                                    <p:set>
+                                      <p:cBhvr>
+                                        <p:cTn id="6" dur="1" fill="hold">
+                                          <p:stCondLst>
+                                            <p:cond delay="0"/>
+                                          </p:stCondLst>
+                                        </p:cTn>
+                                        <p:tgtEl>
+                                          <p:spTgt spid="6"/>
+                                        </p:tgtEl>
+                                        <p:attrNameLst>
+                                          <p:attrName>style.visibility</p:attrName>
+                                        </p:attrNameLst>
+                                      </p:cBhvr>
+                                      <p:to>
+                                        <p:strVal val="visible"/>
+                                      </p:to>
+                                    </p:set>
+                                  </p:childTnLst>
+                                </p:cTn>
+                              </p:par>
+                            </p:childTnLst>
+                          </p:cTn>
+                        </p:par>
+                      </p:childTnLst>
+                    </p:cTn>
+                  </p:par>
+                </p:childTnLst>
+              </p:cTn>
+              <p:prevCondLst>
+                <p:cond evt="onPrev" delay="0">
+                  <p:tgtEl>
+                    <p:sldTgt/>
+                  </p:tgtEl>
+                </p:cond>
+              </p:prevCondLst>
+              <p:nextCondLst>
+                <p:cond evt="onNext" delay="0">
+                  <p:tgtEl>
+                    <p:sldTgt/>
+                  </p:tgtEl>
+                </p:cond>
+              </p:nextCondLst>
+            </p:seq>
+          </p:childTnLst>
+        </p:cTn>
+      </p:par>
+    </p:tnLst>
+  </p:timing>
 </p:sld>
 </file>
 
@@ -25952,8 +26051,8 @@
               </a:prstGeom>
             </p:spPr>
           </p:pic>
-          <mc:AlternateContent xmlns:mc="http://schemas.openxmlformats.org/markup-compatibility/2006">
-            <mc:Choice xmlns:a14="http://schemas.microsoft.com/office/drawing/2010/main" Requires="a14">
+          <mc:AlternateContent xmlns:mc="http://schemas.openxmlformats.org/markup-compatibility/2006" xmlns:a14="http://schemas.microsoft.com/office/drawing/2010/main">
+            <mc:Choice Requires="a14">
               <p:sp>
                 <p:nvSpPr>
                   <p:cNvPr id="12" name="TextBox 11"/>
@@ -26027,7 +26126,7 @@
                 </p:txBody>
               </p:sp>
             </mc:Choice>
-            <mc:Fallback>
+            <mc:Fallback xmlns="">
               <p:sp>
                 <p:nvSpPr>
                   <p:cNvPr id="12" name="TextBox 11"/>
@@ -26066,8 +26165,8 @@
               </p:sp>
             </mc:Fallback>
           </mc:AlternateContent>
-          <mc:AlternateContent xmlns:mc="http://schemas.openxmlformats.org/markup-compatibility/2006">
-            <mc:Choice xmlns:a14="http://schemas.microsoft.com/office/drawing/2010/main" Requires="a14">
+          <mc:AlternateContent xmlns:mc="http://schemas.openxmlformats.org/markup-compatibility/2006" xmlns:a14="http://schemas.microsoft.com/office/drawing/2010/main">
+            <mc:Choice Requires="a14">
               <p:sp>
                 <p:nvSpPr>
                   <p:cNvPr id="13" name="TextBox 12"/>
@@ -26112,7 +26211,7 @@
                 </p:txBody>
               </p:sp>
             </mc:Choice>
-            <mc:Fallback>
+            <mc:Fallback xmlns="">
               <p:sp>
                 <p:nvSpPr>
                   <p:cNvPr id="13" name="TextBox 12"/>
@@ -26242,8 +26341,8 @@
               </a:prstGeom>
             </p:spPr>
           </p:pic>
-          <mc:AlternateContent xmlns:mc="http://schemas.openxmlformats.org/markup-compatibility/2006">
-            <mc:Choice xmlns:a14="http://schemas.microsoft.com/office/drawing/2010/main" Requires="a14">
+          <mc:AlternateContent xmlns:mc="http://schemas.openxmlformats.org/markup-compatibility/2006" xmlns:a14="http://schemas.microsoft.com/office/drawing/2010/main">
+            <mc:Choice Requires="a14">
               <p:sp>
                 <p:nvSpPr>
                   <p:cNvPr id="20" name="TextBox 19"/>
@@ -26288,7 +26387,7 @@
                 </p:txBody>
               </p:sp>
             </mc:Choice>
-            <mc:Fallback>
+            <mc:Fallback xmlns="">
               <p:sp>
                 <p:nvSpPr>
                   <p:cNvPr id="20" name="TextBox 19"/>
@@ -26327,8 +26426,8 @@
               </p:sp>
             </mc:Fallback>
           </mc:AlternateContent>
-          <mc:AlternateContent xmlns:mc="http://schemas.openxmlformats.org/markup-compatibility/2006">
-            <mc:Choice xmlns:a14="http://schemas.microsoft.com/office/drawing/2010/main" Requires="a14">
+          <mc:AlternateContent xmlns:mc="http://schemas.openxmlformats.org/markup-compatibility/2006" xmlns:a14="http://schemas.microsoft.com/office/drawing/2010/main">
+            <mc:Choice Requires="a14">
               <p:sp>
                 <p:nvSpPr>
                   <p:cNvPr id="21" name="TextBox 20"/>
@@ -26402,7 +26501,7 @@
                 </p:txBody>
               </p:sp>
             </mc:Choice>
-            <mc:Fallback>
+            <mc:Fallback xmlns="">
               <p:sp>
                 <p:nvSpPr>
                   <p:cNvPr id="21" name="TextBox 20"/>
@@ -26628,8 +26727,8 @@
           </a:p>
         </p:txBody>
       </p:sp>
-      <mc:AlternateContent xmlns:mc="http://schemas.openxmlformats.org/markup-compatibility/2006">
-        <mc:Choice xmlns:a14="http://schemas.microsoft.com/office/drawing/2010/main" Requires="a14">
+      <mc:AlternateContent xmlns:mc="http://schemas.openxmlformats.org/markup-compatibility/2006" xmlns:a14="http://schemas.microsoft.com/office/drawing/2010/main">
+        <mc:Choice Requires="a14">
           <p:sp>
             <p:nvSpPr>
               <p:cNvPr id="8" name="Rectangle 7"/>
@@ -26816,7 +26915,7 @@
             </p:txBody>
           </p:sp>
         </mc:Choice>
-        <mc:Fallback>
+        <mc:Fallback xmlns="">
           <p:sp>
             <p:nvSpPr>
               <p:cNvPr id="8" name="Rectangle 7"/>

</xml_diff>